<commit_message>
IT Training & Dev Started
</commit_message>
<xml_diff>
--- a/Offline/Marketring/Proposals/IoTandAIforSchools.pptx
+++ b/Offline/Marketring/Proposals/IoTandAIforSchools.pptx
@@ -200,7 +200,7 @@
           <a:p>
             <a:fld id="{D8723606-D842-4BFC-B2CE-0559104D7D54}" type="datetimeFigureOut">
               <a:rPr lang="en-AU" smtClean="0"/>
-              <a:t>19/06/2023</a:t>
+              <a:t>20/06/2023</a:t>
             </a:fld>
             <a:endParaRPr lang="en-AU"/>
           </a:p>
@@ -866,7 +866,7 @@
           <a:p>
             <a:fld id="{F2ADDDAE-CDF1-4778-AA1E-DA2FD3F10BBC}" type="datetime1">
               <a:rPr lang="en-AU" smtClean="0"/>
-              <a:t>19/06/2023</a:t>
+              <a:t>20/06/2023</a:t>
             </a:fld>
             <a:endParaRPr lang="en-AU"/>
           </a:p>
@@ -1036,7 +1036,7 @@
           <a:p>
             <a:fld id="{98C5BF5C-D7F3-44D3-AFFE-42669BDB50FA}" type="datetime1">
               <a:rPr lang="en-AU" smtClean="0"/>
-              <a:t>19/06/2023</a:t>
+              <a:t>20/06/2023</a:t>
             </a:fld>
             <a:endParaRPr lang="en-AU"/>
           </a:p>
@@ -1216,7 +1216,7 @@
           <a:p>
             <a:fld id="{D0ACCCE6-C091-4F3C-97DF-9045C3E1C7BB}" type="datetime1">
               <a:rPr lang="en-AU" smtClean="0"/>
-              <a:t>19/06/2023</a:t>
+              <a:t>20/06/2023</a:t>
             </a:fld>
             <a:endParaRPr lang="en-AU"/>
           </a:p>
@@ -1386,7 +1386,7 @@
           <a:p>
             <a:fld id="{3E0FA4AE-7594-491C-AD30-0988051527D1}" type="datetime1">
               <a:rPr lang="en-AU" smtClean="0"/>
-              <a:t>19/06/2023</a:t>
+              <a:t>20/06/2023</a:t>
             </a:fld>
             <a:endParaRPr lang="en-AU"/>
           </a:p>
@@ -1630,7 +1630,7 @@
           <a:p>
             <a:fld id="{BC9CEA11-1E98-49CA-96D5-627DB67B3B52}" type="datetime1">
               <a:rPr lang="en-AU" smtClean="0"/>
-              <a:t>19/06/2023</a:t>
+              <a:t>20/06/2023</a:t>
             </a:fld>
             <a:endParaRPr lang="en-AU"/>
           </a:p>
@@ -1862,7 +1862,7 @@
           <a:p>
             <a:fld id="{99F708EF-B16A-4F9B-B5E8-20A8C0CE0217}" type="datetime1">
               <a:rPr lang="en-AU" smtClean="0"/>
-              <a:t>19/06/2023</a:t>
+              <a:t>20/06/2023</a:t>
             </a:fld>
             <a:endParaRPr lang="en-AU"/>
           </a:p>
@@ -2229,7 +2229,7 @@
           <a:p>
             <a:fld id="{64E368F4-79D4-464B-9B2A-7A8ABED3605F}" type="datetime1">
               <a:rPr lang="en-AU" smtClean="0"/>
-              <a:t>19/06/2023</a:t>
+              <a:t>20/06/2023</a:t>
             </a:fld>
             <a:endParaRPr lang="en-AU"/>
           </a:p>
@@ -2347,7 +2347,7 @@
           <a:p>
             <a:fld id="{05BC2668-FDF3-4206-A3B0-4E7909F8C96B}" type="datetime1">
               <a:rPr lang="en-AU" smtClean="0"/>
-              <a:t>19/06/2023</a:t>
+              <a:t>20/06/2023</a:t>
             </a:fld>
             <a:endParaRPr lang="en-AU"/>
           </a:p>
@@ -2442,7 +2442,7 @@
           <a:p>
             <a:fld id="{C3BDF235-ED69-482B-BF73-41181159C8C9}" type="datetime1">
               <a:rPr lang="en-AU" smtClean="0"/>
-              <a:t>19/06/2023</a:t>
+              <a:t>20/06/2023</a:t>
             </a:fld>
             <a:endParaRPr lang="en-AU"/>
           </a:p>
@@ -2719,7 +2719,7 @@
           <a:p>
             <a:fld id="{849F198C-7034-410C-A022-7AB92A01219A}" type="datetime1">
               <a:rPr lang="en-AU" smtClean="0"/>
-              <a:t>19/06/2023</a:t>
+              <a:t>20/06/2023</a:t>
             </a:fld>
             <a:endParaRPr lang="en-AU"/>
           </a:p>
@@ -2976,7 +2976,7 @@
           <a:p>
             <a:fld id="{DBBB7656-E00F-4E49-8752-58986387913B}" type="datetime1">
               <a:rPr lang="en-AU" smtClean="0"/>
-              <a:t>19/06/2023</a:t>
+              <a:t>20/06/2023</a:t>
             </a:fld>
             <a:endParaRPr lang="en-AU"/>
           </a:p>
@@ -3189,7 +3189,7 @@
           <a:p>
             <a:fld id="{89BD7621-0782-44FA-A141-1F62C0C35485}" type="datetime1">
               <a:rPr lang="en-AU" smtClean="0"/>
-              <a:t>19/06/2023</a:t>
+              <a:t>20/06/2023</a:t>
             </a:fld>
             <a:endParaRPr lang="en-AU"/>
           </a:p>
@@ -6126,7 +6126,7 @@
           <a:graphicData uri="http://schemas.openxmlformats.org/presentationml/2006/ole">
             <mc:AlternateContent xmlns:mc="http://schemas.openxmlformats.org/markup-compatibility/2006">
               <mc:Choice xmlns:v="urn:schemas-microsoft-com:vml" Requires="v">
-                <p:oleObj spid="_x0000_s1038" name="Acrobat Document" r:id="rId7" imgW="6035040" imgH="4663156" progId="Acrobat.Document.DC">
+                <p:oleObj spid="_x0000_s1056" name="Acrobat Document" r:id="rId7" imgW="6035040" imgH="4663156" progId="Acrobat.Document.DC">
                   <p:embed/>
                 </p:oleObj>
               </mc:Choice>
@@ -6170,20 +6170,20 @@
           <p:nvPr>
             <p:extLst>
               <p:ext uri="{D42A27DB-BD31-4B8C-83A1-F6EECF244321}">
-                <p14:modId xmlns:p14="http://schemas.microsoft.com/office/powerpoint/2010/main" val="513267735"/>
+                <p14:modId xmlns:p14="http://schemas.microsoft.com/office/powerpoint/2010/main" val="1231283010"/>
               </p:ext>
             </p:extLst>
           </p:nvPr>
         </p:nvGraphicFramePr>
         <p:xfrm>
-          <a:off x="2498230" y="4517375"/>
+          <a:off x="2498230" y="4508749"/>
           <a:ext cx="2115467" cy="1634174"/>
         </p:xfrm>
         <a:graphic>
           <a:graphicData uri="http://schemas.openxmlformats.org/presentationml/2006/ole">
             <mc:AlternateContent xmlns:mc="http://schemas.openxmlformats.org/markup-compatibility/2006">
               <mc:Choice xmlns:v="urn:schemas-microsoft-com:vml" Requires="v">
-                <p:oleObj spid="_x0000_s1039" name="Acrobat Document" r:id="rId9" imgW="6035040" imgH="4663156" progId="Acrobat.Document.DC">
+                <p:oleObj spid="_x0000_s1057" name="Acrobat Document" r:id="rId9" imgW="6035040" imgH="4663156" progId="Acrobat.Document.DC">
                   <p:embed/>
                 </p:oleObj>
               </mc:Choice>
@@ -6204,7 +6204,7 @@
                     </p:blipFill>
                     <p:spPr>
                       <a:xfrm>
-                        <a:off x="2498230" y="4517375"/>
+                        <a:off x="2498230" y="4508749"/>
                         <a:ext cx="2115467" cy="1634174"/>
                       </a:xfrm>
                       <a:prstGeom prst="rect">
@@ -6227,20 +6227,20 @@
           <p:nvPr>
             <p:extLst>
               <p:ext uri="{D42A27DB-BD31-4B8C-83A1-F6EECF244321}">
-                <p14:modId xmlns:p14="http://schemas.microsoft.com/office/powerpoint/2010/main" val="141432509"/>
+                <p14:modId xmlns:p14="http://schemas.microsoft.com/office/powerpoint/2010/main" val="1496009654"/>
               </p:ext>
             </p:extLst>
           </p:nvPr>
         </p:nvGraphicFramePr>
         <p:xfrm>
-          <a:off x="3533687" y="4539995"/>
+          <a:off x="3533687" y="4531369"/>
           <a:ext cx="2115467" cy="1634174"/>
         </p:xfrm>
         <a:graphic>
           <a:graphicData uri="http://schemas.openxmlformats.org/presentationml/2006/ole">
             <mc:AlternateContent xmlns:mc="http://schemas.openxmlformats.org/markup-compatibility/2006">
               <mc:Choice xmlns:v="urn:schemas-microsoft-com:vml" Requires="v">
-                <p:oleObj spid="_x0000_s1040" name="Acrobat Document" r:id="rId11" imgW="6035040" imgH="4663156" progId="Acrobat.Document.DC">
+                <p:oleObj spid="_x0000_s1058" name="Acrobat Document" r:id="rId11" imgW="6035040" imgH="4663156" progId="Acrobat.Document.DC">
                   <p:embed/>
                 </p:oleObj>
               </mc:Choice>
@@ -6261,7 +6261,7 @@
                     </p:blipFill>
                     <p:spPr>
                       <a:xfrm>
-                        <a:off x="3533687" y="4539995"/>
+                        <a:off x="3533687" y="4531369"/>
                         <a:ext cx="2115467" cy="1634174"/>
                       </a:xfrm>
                       <a:prstGeom prst="rect">
@@ -6284,20 +6284,20 @@
           <p:nvPr>
             <p:extLst>
               <p:ext uri="{D42A27DB-BD31-4B8C-83A1-F6EECF244321}">
-                <p14:modId xmlns:p14="http://schemas.microsoft.com/office/powerpoint/2010/main" val="917014889"/>
+                <p14:modId xmlns:p14="http://schemas.microsoft.com/office/powerpoint/2010/main" val="3332241506"/>
               </p:ext>
             </p:extLst>
           </p:nvPr>
         </p:nvGraphicFramePr>
         <p:xfrm>
-          <a:off x="4573856" y="4573535"/>
+          <a:off x="4573856" y="4547657"/>
           <a:ext cx="2115467" cy="1634174"/>
         </p:xfrm>
         <a:graphic>
           <a:graphicData uri="http://schemas.openxmlformats.org/presentationml/2006/ole">
             <mc:AlternateContent xmlns:mc="http://schemas.openxmlformats.org/markup-compatibility/2006">
               <mc:Choice xmlns:v="urn:schemas-microsoft-com:vml" Requires="v">
-                <p:oleObj spid="_x0000_s1041" name="Acrobat Document" r:id="rId13" imgW="6035040" imgH="4663156" progId="Acrobat.Document.DC">
+                <p:oleObj spid="_x0000_s1059" name="Acrobat Document" r:id="rId13" imgW="6035040" imgH="4663156" progId="Acrobat.Document.DC">
                   <p:embed/>
                 </p:oleObj>
               </mc:Choice>
@@ -6318,7 +6318,7 @@
                     </p:blipFill>
                     <p:spPr>
                       <a:xfrm>
-                        <a:off x="4573856" y="4573535"/>
+                        <a:off x="4573856" y="4547657"/>
                         <a:ext cx="2115467" cy="1634174"/>
                       </a:xfrm>
                       <a:prstGeom prst="rect">
@@ -6341,20 +6341,20 @@
           <p:nvPr>
             <p:extLst>
               <p:ext uri="{D42A27DB-BD31-4B8C-83A1-F6EECF244321}">
-                <p14:modId xmlns:p14="http://schemas.microsoft.com/office/powerpoint/2010/main" val="2371406039"/>
+                <p14:modId xmlns:p14="http://schemas.microsoft.com/office/powerpoint/2010/main" val="1892246981"/>
               </p:ext>
             </p:extLst>
           </p:nvPr>
         </p:nvGraphicFramePr>
         <p:xfrm>
-          <a:off x="5619491" y="4587529"/>
+          <a:off x="5619491" y="4561651"/>
           <a:ext cx="2115467" cy="1634174"/>
         </p:xfrm>
         <a:graphic>
           <a:graphicData uri="http://schemas.openxmlformats.org/presentationml/2006/ole">
             <mc:AlternateContent xmlns:mc="http://schemas.openxmlformats.org/markup-compatibility/2006">
               <mc:Choice xmlns:v="urn:schemas-microsoft-com:vml" Requires="v">
-                <p:oleObj spid="_x0000_s1042" name="Acrobat Document" r:id="rId15" imgW="6035040" imgH="4663156" progId="Acrobat.Document.DC">
+                <p:oleObj spid="_x0000_s1060" name="Acrobat Document" r:id="rId15" imgW="6035040" imgH="4663156" progId="Acrobat.Document.DC">
                   <p:embed/>
                 </p:oleObj>
               </mc:Choice>
@@ -6375,7 +6375,7 @@
                     </p:blipFill>
                     <p:spPr>
                       <a:xfrm>
-                        <a:off x="5619491" y="4587529"/>
+                        <a:off x="5619491" y="4561651"/>
                         <a:ext cx="2115467" cy="1634174"/>
                       </a:xfrm>
                       <a:prstGeom prst="rect">
@@ -6398,20 +6398,20 @@
           <p:nvPr>
             <p:extLst>
               <p:ext uri="{D42A27DB-BD31-4B8C-83A1-F6EECF244321}">
-                <p14:modId xmlns:p14="http://schemas.microsoft.com/office/powerpoint/2010/main" val="2079896018"/>
+                <p14:modId xmlns:p14="http://schemas.microsoft.com/office/powerpoint/2010/main" val="1066791624"/>
               </p:ext>
             </p:extLst>
           </p:nvPr>
         </p:nvGraphicFramePr>
         <p:xfrm>
-          <a:off x="6649506" y="4592324"/>
+          <a:off x="6649506" y="4583698"/>
           <a:ext cx="2115467" cy="1634174"/>
         </p:xfrm>
         <a:graphic>
           <a:graphicData uri="http://schemas.openxmlformats.org/presentationml/2006/ole">
             <mc:AlternateContent xmlns:mc="http://schemas.openxmlformats.org/markup-compatibility/2006">
               <mc:Choice xmlns:v="urn:schemas-microsoft-com:vml" Requires="v">
-                <p:oleObj spid="_x0000_s1043" name="Acrobat Document" r:id="rId17" imgW="6035040" imgH="4663156" progId="Acrobat.Document.DC">
+                <p:oleObj spid="_x0000_s1061" name="Acrobat Document" r:id="rId17" imgW="6035040" imgH="4663156" progId="Acrobat.Document.DC">
                   <p:embed/>
                 </p:oleObj>
               </mc:Choice>
@@ -6432,7 +6432,7 @@
                     </p:blipFill>
                     <p:spPr>
                       <a:xfrm>
-                        <a:off x="6649506" y="4592324"/>
+                        <a:off x="6649506" y="4583698"/>
                         <a:ext cx="2115467" cy="1634174"/>
                       </a:xfrm>
                       <a:prstGeom prst="rect">
@@ -6697,7 +6697,7 @@
         <p:spPr>
           <a:xfrm>
             <a:off x="4723903" y="1453975"/>
-            <a:ext cx="3038790" cy="1077218"/>
+            <a:ext cx="4041070" cy="1077218"/>
           </a:xfrm>
           <a:prstGeom prst="rect">
             <a:avLst/>
@@ -6724,7 +6724,16 @@
                 </a:solidFill>
                 <a:latin typeface="Oxygen" panose="02000503000000000000" pitchFamily="2" charset="0"/>
               </a:rPr>
-              <a:t>Caring Like Elder Brother</a:t>
+              <a:t>23 years of global </a:t>
+            </a:r>
+            <a:r>
+              <a:rPr lang="en-US" sz="1600" b="1" dirty="0" err="1" smtClean="0">
+                <a:solidFill>
+                  <a:srgbClr val="FF8C52"/>
+                </a:solidFill>
+                <a:latin typeface="Oxygen" panose="02000503000000000000" pitchFamily="2" charset="0"/>
+              </a:rPr>
+              <a:t>experince</a:t>
             </a:r>
             <a:endParaRPr lang="en-AU" sz="1600" b="1" dirty="0" smtClean="0">
               <a:solidFill>

</xml_diff>